<commit_message>
-  ( https://italent.cloudapp.net:9443/ccm/web/projects/iTalent#action=com.ibm.team.workitem.viewWorkItem&id= )
</commit_message>
<xml_diff>
--- a/italent/documents/Presentatie/Presentatie.pptx
+++ b/italent/documents/Presentatie/Presentatie.pptx
@@ -119,7 +119,7 @@
   </p:defaultTextStyle>
   <p:extLst>
     <p:ext uri="{EFAFB233-063F-42B5-8137-9DF3F51BA10A}">
-      <p15:sldGuideLst xmlns="" xmlns:p15="http://schemas.microsoft.com/office/powerpoint/2012/main">
+      <p15:sldGuideLst xmlns:p15="http://schemas.microsoft.com/office/powerpoint/2012/main" xmlns="">
         <p15:guide id="1" orient="horz" pos="2160">
           <p15:clr>
             <a:srgbClr val="A4A3A4"/>
@@ -709,7 +709,7 @@
               <a:pPr>
                 <a:defRPr/>
               </a:pPr>
-              <a:t>10-6-2016</a:t>
+              <a:t>12-6-2016</a:t>
             </a:fld>
             <a:endParaRPr lang="nl-NL" dirty="0">
               <a:solidFill>
@@ -1065,7 +1065,7 @@
               <a:pPr>
                 <a:defRPr/>
               </a:pPr>
-              <a:t>10-6-2016</a:t>
+              <a:t>12-6-2016</a:t>
             </a:fld>
             <a:endParaRPr lang="nl-NL" dirty="0"/>
           </a:p>
@@ -1330,7 +1330,7 @@
               <a:pPr>
                 <a:defRPr/>
               </a:pPr>
-              <a:t>10-6-2016</a:t>
+              <a:t>12-6-2016</a:t>
             </a:fld>
             <a:endParaRPr lang="nl-NL">
               <a:solidFill>
@@ -1609,7 +1609,7 @@
               <a:pPr>
                 <a:defRPr/>
               </a:pPr>
-              <a:t>10-6-2016</a:t>
+              <a:t>12-6-2016</a:t>
             </a:fld>
             <a:endParaRPr lang="nl-NL">
               <a:solidFill>
@@ -1878,7 +1878,7 @@
               <a:pPr>
                 <a:defRPr/>
               </a:pPr>
-              <a:t>10-6-2016</a:t>
+              <a:t>12-6-2016</a:t>
             </a:fld>
             <a:endParaRPr lang="nl-NL">
               <a:solidFill>
@@ -2261,7 +2261,7 @@
               <a:pPr>
                 <a:defRPr/>
               </a:pPr>
-              <a:t>10-6-2016</a:t>
+              <a:t>12-6-2016</a:t>
             </a:fld>
             <a:endParaRPr lang="nl-NL" dirty="0"/>
           </a:p>
@@ -2644,7 +2644,7 @@
               <a:pPr>
                 <a:defRPr/>
               </a:pPr>
-              <a:t>10-6-2016</a:t>
+              <a:t>12-6-2016</a:t>
             </a:fld>
             <a:endParaRPr lang="nl-NL">
               <a:solidFill>
@@ -3165,7 +3165,7 @@
               <a:pPr>
                 <a:defRPr/>
               </a:pPr>
-              <a:t>10-6-2016</a:t>
+              <a:t>12-6-2016</a:t>
             </a:fld>
             <a:endParaRPr lang="nl-NL">
               <a:solidFill>
@@ -3382,7 +3382,7 @@
               <a:pPr>
                 <a:defRPr/>
               </a:pPr>
-              <a:t>10-6-2016</a:t>
+              <a:t>12-6-2016</a:t>
             </a:fld>
             <a:endParaRPr lang="nl-NL">
               <a:solidFill>
@@ -3576,7 +3576,7 @@
               <a:pPr>
                 <a:defRPr/>
               </a:pPr>
-              <a:t>10-6-2016</a:t>
+              <a:t>12-6-2016</a:t>
             </a:fld>
             <a:endParaRPr lang="nl-NL">
               <a:solidFill>
@@ -3952,7 +3952,7 @@
               <a:pPr>
                 <a:defRPr/>
               </a:pPr>
-              <a:t>10-6-2016</a:t>
+              <a:t>12-6-2016</a:t>
             </a:fld>
             <a:endParaRPr lang="nl-NL">
               <a:solidFill>
@@ -4265,7 +4265,7 @@
               <a:pPr defTabSz="457200">
                 <a:defRPr/>
               </a:pPr>
-              <a:t>10-6-2016</a:t>
+              <a:t>12-6-2016</a:t>
             </a:fld>
             <a:endParaRPr lang="nl-NL">
               <a:solidFill>
@@ -5247,10 +5247,6 @@
               <a:rPr lang="nl-BE" dirty="0" smtClean="0"/>
               <a:t>IT-Project</a:t>
             </a:r>
-            <a:r>
-              <a:rPr lang="nl-BE" dirty="0" smtClean="0"/>
-              <a:t/>
-            </a:r>
             <a:br>
               <a:rPr lang="nl-BE" dirty="0" smtClean="0"/>
             </a:br>
@@ -5305,23 +5301,7 @@
                   <a:schemeClr val="tx1"/>
                 </a:solidFill>
               </a:rPr>
-              <a:t>Arjen </a:t>
-            </a:r>
-            <a:r>
-              <a:rPr lang="nl-BE" sz="1800" dirty="0" smtClean="0">
-                <a:solidFill>
-                  <a:schemeClr val="tx1"/>
-                </a:solidFill>
-              </a:rPr>
-              <a:t>Schuurman</a:t>
-            </a:r>
-            <a:r>
-              <a:rPr lang="nl-BE" sz="1800" dirty="0" smtClean="0">
-                <a:solidFill>
-                  <a:schemeClr val="tx1"/>
-                </a:solidFill>
-              </a:rPr>
-              <a:t/>
+              <a:t>Arjen Schuurman</a:t>
             </a:r>
             <a:br>
               <a:rPr lang="nl-BE" sz="1800" dirty="0" smtClean="0">
@@ -6283,13 +6263,8 @@
             </a:pPr>
             <a:r>
               <a:rPr lang="nl-BE" sz="3200" dirty="0" smtClean="0"/>
-              <a:t>Web </a:t>
-            </a:r>
-            <a:r>
-              <a:rPr lang="nl-BE" sz="3200" dirty="0" smtClean="0"/>
-              <a:t>applicatie</a:t>
-            </a:r>
-            <a:endParaRPr lang="nl-BE" sz="3200" dirty="0" smtClean="0"/>
+              <a:t>Webapplicatie</a:t>
+            </a:r>
           </a:p>
           <a:p>
             <a:pPr marL="457200" indent="-457200" defTabSz="457200" eaLnBrk="0" fontAlgn="base" hangingPunct="0">
@@ -6304,8 +6279,9 @@
             </a:pPr>
             <a:r>
               <a:rPr lang="nl-BE" sz="3200" dirty="0" smtClean="0"/>
-              <a:t>Kickstarter</a:t>
-            </a:r>
+              <a:t>Ideeën pitchen</a:t>
+            </a:r>
+            <a:endParaRPr lang="nl-BE" sz="3200" dirty="0" smtClean="0"/>
           </a:p>
           <a:p>
             <a:pPr marL="457200" indent="-457200" defTabSz="457200" eaLnBrk="0" fontAlgn="base" hangingPunct="0">
@@ -6320,15 +6296,7 @@
             </a:pPr>
             <a:r>
               <a:rPr lang="nl-BE" sz="3200" dirty="0" smtClean="0"/>
-              <a:t>Pitch idea </a:t>
-            </a:r>
-            <a:r>
-              <a:rPr lang="nl-BE" sz="3200" dirty="0"/>
-              <a:t>with </a:t>
-            </a:r>
-            <a:r>
-              <a:rPr lang="nl-BE" sz="3200" dirty="0" smtClean="0"/>
-              <a:t>media</a:t>
+              <a:t>Kickstarter</a:t>
             </a:r>
           </a:p>
           <a:p>
@@ -6344,7 +6312,15 @@
             </a:pPr>
             <a:r>
               <a:rPr lang="nl-BE" sz="3200" dirty="0" smtClean="0"/>
-              <a:t>Like/Subscribe</a:t>
+              <a:t>‘</a:t>
+            </a:r>
+            <a:r>
+              <a:rPr lang="nl-BE" sz="3200" i="1" dirty="0" smtClean="0"/>
+              <a:t>Liken</a:t>
+            </a:r>
+            <a:r>
+              <a:rPr lang="nl-BE" sz="3200" dirty="0" smtClean="0"/>
+              <a:t>’/leuk vinden</a:t>
             </a:r>
           </a:p>
           <a:p>
@@ -6359,24 +6335,27 @@
               <a:buChar char="•"/>
             </a:pPr>
             <a:r>
-              <a:rPr lang="nl-BE" sz="3200" dirty="0"/>
-              <a:t>S</a:t>
-            </a:r>
-            <a:r>
               <a:rPr lang="nl-BE" sz="3200" dirty="0" smtClean="0"/>
-              <a:t>tatus updates</a:t>
-            </a:r>
-            <a:r>
-              <a:rPr lang="nl-BE" sz="3200" dirty="0"/>
-              <a:t/>
-            </a:r>
-            <a:br>
-              <a:rPr lang="nl-BE" sz="3200" dirty="0"/>
-            </a:br>
-            <a:r>
-              <a:rPr lang="nl-BE" sz="3200" dirty="0"/>
-              <a:t> </a:t>
-            </a:r>
+              <a:t>Inschrijven/steunen</a:t>
+            </a:r>
+            <a:endParaRPr lang="nl-BE" sz="3200" dirty="0" smtClean="0"/>
+          </a:p>
+          <a:p>
+            <a:pPr marL="457200" indent="-457200" defTabSz="457200" eaLnBrk="0" fontAlgn="base" hangingPunct="0">
+              <a:spcBef>
+                <a:spcPct val="20000"/>
+              </a:spcBef>
+              <a:spcAft>
+                <a:spcPct val="0"/>
+              </a:spcAft>
+              <a:buFont typeface="Arial" panose="020B0604020202020204" pitchFamily="34" charset="0"/>
+              <a:buChar char="•"/>
+            </a:pPr>
+            <a:r>
+              <a:rPr lang="nl-BE" sz="3200" dirty="0" smtClean="0"/>
+              <a:t>Opvolging </a:t>
+            </a:r>
+            <a:endParaRPr lang="nl-BE" sz="3200" dirty="0"/>
           </a:p>
         </p:txBody>
       </p:sp>
@@ -6467,7 +6446,7 @@
           <a:p>
             <a:r>
               <a:rPr lang="nl-BE" b="1" dirty="0" smtClean="0"/>
-              <a:t>I-Talent Platform</a:t>
+              <a:t>I-Talent-Platform</a:t>
             </a:r>
             <a:endParaRPr lang="nl-BE" dirty="0"/>
           </a:p>
@@ -6612,7 +6591,7 @@
           <a:p>
             <a:r>
               <a:rPr lang="nl-BE" b="1" dirty="0" smtClean="0"/>
-              <a:t>I-Talent Platform</a:t>
+              <a:t>I-Talent-Platform</a:t>
             </a:r>
             <a:endParaRPr lang="nl-BE" dirty="0"/>
           </a:p>
@@ -6652,14 +6631,14 @@
             <a:pPr lvl="0"/>
             <a:r>
               <a:rPr lang="nl-BE" dirty="0" smtClean="0"/>
-              <a:t>Web based</a:t>
+              <a:t>Webapplicatie</a:t>
             </a:r>
             <a:endParaRPr lang="nl-BE" dirty="0"/>
           </a:p>
           <a:p>
             <a:pPr lvl="0"/>
             <a:r>
-              <a:rPr lang="en-US" dirty="0" smtClean="0"/>
+              <a:rPr lang="en-US" i="1" dirty="0" smtClean="0"/>
               <a:t>Future proof</a:t>
             </a:r>
           </a:p>
@@ -6673,18 +6652,18 @@
           <a:p>
             <a:pPr lvl="0"/>
             <a:r>
-              <a:rPr lang="nl-BE" dirty="0" smtClean="0"/>
+              <a:rPr lang="nl-BE" i="1" dirty="0" smtClean="0"/>
               <a:t>Single page</a:t>
             </a:r>
-            <a:endParaRPr lang="nl-BE" dirty="0"/>
+            <a:endParaRPr lang="nl-BE" i="1" dirty="0"/>
           </a:p>
           <a:p>
             <a:pPr lvl="0"/>
             <a:r>
-              <a:rPr lang="en-US" dirty="0" smtClean="0"/>
+              <a:rPr lang="en-US" i="1" dirty="0" smtClean="0"/>
               <a:t>Open Source</a:t>
             </a:r>
-            <a:endParaRPr lang="nl-BE" dirty="0"/>
+            <a:endParaRPr lang="nl-BE" i="1" dirty="0"/>
           </a:p>
         </p:txBody>
       </p:sp>
@@ -6741,9 +6720,10 @@
           <a:lstStyle/>
           <a:p>
             <a:r>
-              <a:rPr lang="nl-BE" dirty="0"/>
-              <a:t>I-Talent Platform</a:t>
-            </a:r>
+              <a:rPr lang="nl-BE" dirty="0" smtClean="0"/>
+              <a:t>I-Talent-Platform</a:t>
+            </a:r>
+            <a:endParaRPr lang="nl-BE" dirty="0"/>
           </a:p>
         </p:txBody>
       </p:sp>
@@ -6895,9 +6875,10 @@
           <a:lstStyle/>
           <a:p>
             <a:r>
-              <a:rPr lang="nl-BE" dirty="0"/>
-              <a:t>I-Talent Platform</a:t>
-            </a:r>
+              <a:rPr lang="nl-BE" dirty="0" smtClean="0"/>
+              <a:t>I-Talent-Platform</a:t>
+            </a:r>
+            <a:endParaRPr lang="nl-BE" dirty="0"/>
           </a:p>
         </p:txBody>
       </p:sp>

</xml_diff>

<commit_message>
71 - Automate MySQL entries on table-creation ( https://italent.cloudapp.net:9443/ccm/web/projects/iTalent#action=com.ibm.team.workitem.viewWorkItem&id=71 )
</commit_message>
<xml_diff>
--- a/italent/documents/Presentatie/Presentatie.pptx
+++ b/italent/documents/Presentatie/Presentatie.pptx
@@ -139,7 +139,7 @@
   </p:defaultTextStyle>
   <p:extLst>
     <p:ext uri="{EFAFB233-063F-42B5-8137-9DF3F51BA10A}">
-      <p15:sldGuideLst xmlns="" xmlns:p15="http://schemas.microsoft.com/office/powerpoint/2012/main">
+      <p15:sldGuideLst xmlns:p15="http://schemas.microsoft.com/office/powerpoint/2012/main">
         <p15:guide id="1" orient="horz" pos="2160">
           <p15:clr>
             <a:srgbClr val="A4A3A4"/>
@@ -153,7 +153,7 @@
       </p15:sldGuideLst>
     </p:ext>
     <p:ext uri="{2D200454-40CA-4A62-9FC3-DE9A4176ACB9}">
-      <p15:notesGuideLst xmlns="" xmlns:p15="http://schemas.microsoft.com/office/powerpoint/2012/main"/>
+      <p15:notesGuideLst xmlns:p15="http://schemas.microsoft.com/office/powerpoint/2012/main"/>
     </p:ext>
   </p:extLst>
 </p:presentation>
@@ -6319,15 +6319,17 @@
             <a:pPr lvl="1"/>
             <a:r>
               <a:rPr lang="nl-BE" dirty="0" smtClean="0"/>
-              <a:t>Communicatie</a:t>
-            </a:r>
+              <a:t>Communicatie (6)</a:t>
+            </a:r>
+            <a:endParaRPr lang="nl-BE" dirty="0" smtClean="0"/>
           </a:p>
           <a:p>
             <a:pPr lvl="1"/>
             <a:r>
-              <a:rPr lang="nl-BE" dirty="0" smtClean="0"/>
-              <a:t>Planning</a:t>
-            </a:r>
+              <a:rPr lang="nl-BE" smtClean="0"/>
+              <a:t>Planning (2)</a:t>
+            </a:r>
+            <a:endParaRPr lang="nl-BE" dirty="0" smtClean="0"/>
           </a:p>
           <a:p>
             <a:endParaRPr lang="nl-BE" dirty="0" smtClean="0"/>
@@ -10363,7 +10365,6 @@
               <a:rPr lang="nl-BE" dirty="0" smtClean="0"/>
               <a:t>Beveiligd</a:t>
             </a:r>
-            <a:endParaRPr lang="nl-BE" dirty="0" smtClean="0"/>
           </a:p>
           <a:p>
             <a:r>
@@ -11174,8 +11175,74 @@
           <a:p>
             <a:r>
               <a:rPr lang="en-US" dirty="0" smtClean="0"/>
-              <a:t>Eclipse + RTC plugin</a:t>
-            </a:r>
+              <a:t>Eclipse </a:t>
+            </a:r>
+            <a:r>
+              <a:rPr lang="en-US" dirty="0" smtClean="0"/>
+              <a:t>+ RTC </a:t>
+            </a:r>
+            <a:r>
+              <a:rPr lang="en-US" dirty="0" smtClean="0"/>
+              <a:t>plugin</a:t>
+            </a:r>
+          </a:p>
+          <a:p>
+            <a:pPr lvl="1"/>
+            <a:r>
+              <a:rPr lang="en-US" dirty="0" err="1" smtClean="0"/>
+              <a:t>Binnenkomende</a:t>
+            </a:r>
+            <a:r>
+              <a:rPr lang="en-US" dirty="0" smtClean="0"/>
+              <a:t>/</a:t>
+            </a:r>
+            <a:r>
+              <a:rPr lang="en-US" dirty="0" err="1" smtClean="0"/>
+              <a:t>uitgaande</a:t>
+            </a:r>
+            <a:r>
+              <a:rPr lang="en-US" dirty="0" smtClean="0"/>
+              <a:t> </a:t>
+            </a:r>
+            <a:r>
+              <a:rPr lang="en-US" dirty="0" err="1" smtClean="0"/>
+              <a:t>veranderingen</a:t>
+            </a:r>
+            <a:endParaRPr lang="en-US" dirty="0" smtClean="0"/>
+          </a:p>
+          <a:p>
+            <a:pPr lvl="1"/>
+            <a:r>
+              <a:rPr lang="en-US" dirty="0" err="1" smtClean="0"/>
+              <a:t>Conflicten</a:t>
+            </a:r>
+            <a:endParaRPr lang="en-US" dirty="0" smtClean="0"/>
+          </a:p>
+          <a:p>
+            <a:pPr lvl="1"/>
+            <a:r>
+              <a:rPr lang="en-US" dirty="0" smtClean="0"/>
+              <a:t>File locks</a:t>
+            </a:r>
+          </a:p>
+          <a:p>
+            <a:pPr lvl="1"/>
+            <a:endParaRPr lang="en-US" dirty="0"/>
+          </a:p>
+          <a:p>
+            <a:pPr lvl="1"/>
+            <a:r>
+              <a:rPr lang="en-US" dirty="0" err="1" smtClean="0"/>
+              <a:t>Gedecentraliseerd</a:t>
+            </a:r>
+            <a:endParaRPr lang="en-US" dirty="0" smtClean="0"/>
+          </a:p>
+          <a:p>
+            <a:pPr lvl="1"/>
+            <a:endParaRPr lang="en-US" dirty="0" smtClean="0"/>
+          </a:p>
+          <a:p>
+            <a:pPr lvl="1"/>
             <a:endParaRPr lang="nl-BE" dirty="0"/>
           </a:p>
         </p:txBody>
@@ -11225,7 +11292,7 @@
         </p:blipFill>
         <p:spPr>
           <a:xfrm>
-            <a:off x="4473066" y="2642694"/>
+            <a:off x="4660094" y="2753780"/>
             <a:ext cx="7362375" cy="3664581"/>
           </a:xfrm>
           <a:prstGeom prst="rect">
@@ -11233,6 +11300,94 @@
           </a:prstGeom>
         </p:spPr>
       </p:pic>
+      <p:sp>
+        <p:nvSpPr>
+          <p:cNvPr id="5" name="Rectangle 4"/>
+          <p:cNvSpPr/>
+          <p:nvPr/>
+        </p:nvSpPr>
+        <p:spPr>
+          <a:xfrm>
+            <a:off x="4632385" y="4452362"/>
+            <a:ext cx="4597879" cy="267419"/>
+          </a:xfrm>
+          <a:prstGeom prst="rect">
+            <a:avLst/>
+          </a:prstGeom>
+          <a:noFill/>
+          <a:ln w="25400">
+            <a:solidFill>
+              <a:srgbClr val="FF0000"/>
+            </a:solidFill>
+          </a:ln>
+        </p:spPr>
+        <p:style>
+          <a:lnRef idx="1">
+            <a:schemeClr val="accent1"/>
+          </a:lnRef>
+          <a:fillRef idx="3">
+            <a:schemeClr val="accent1"/>
+          </a:fillRef>
+          <a:effectRef idx="2">
+            <a:schemeClr val="accent1"/>
+          </a:effectRef>
+          <a:fontRef idx="minor">
+            <a:schemeClr val="lt1"/>
+          </a:fontRef>
+        </p:style>
+        <p:txBody>
+          <a:bodyPr rtlCol="0" anchor="ctr"/>
+          <a:lstStyle/>
+          <a:p>
+            <a:pPr algn="ctr"/>
+            <a:endParaRPr lang="nl-BE"/>
+          </a:p>
+        </p:txBody>
+      </p:sp>
+      <p:sp>
+        <p:nvSpPr>
+          <p:cNvPr id="9" name="Rectangle 8"/>
+          <p:cNvSpPr/>
+          <p:nvPr/>
+        </p:nvSpPr>
+        <p:spPr>
+          <a:xfrm>
+            <a:off x="4660094" y="5393690"/>
+            <a:ext cx="4597879" cy="267419"/>
+          </a:xfrm>
+          <a:prstGeom prst="rect">
+            <a:avLst/>
+          </a:prstGeom>
+          <a:noFill/>
+          <a:ln w="25400">
+            <a:solidFill>
+              <a:srgbClr val="FF0000"/>
+            </a:solidFill>
+          </a:ln>
+        </p:spPr>
+        <p:style>
+          <a:lnRef idx="1">
+            <a:schemeClr val="accent1"/>
+          </a:lnRef>
+          <a:fillRef idx="3">
+            <a:schemeClr val="accent1"/>
+          </a:fillRef>
+          <a:effectRef idx="2">
+            <a:schemeClr val="accent1"/>
+          </a:effectRef>
+          <a:fontRef idx="minor">
+            <a:schemeClr val="lt1"/>
+          </a:fontRef>
+        </p:style>
+        <p:txBody>
+          <a:bodyPr rtlCol="0" anchor="ctr"/>
+          <a:lstStyle/>
+          <a:p>
+            <a:pPr algn="ctr"/>
+            <a:endParaRPr lang="nl-BE"/>
+          </a:p>
+        </p:txBody>
+      </p:sp>
     </p:spTree>
     <p:extLst>
       <p:ext uri="{BB962C8B-B14F-4D97-AF65-F5344CB8AC3E}">
@@ -11301,7 +11456,43 @@
           <a:bodyPr/>
           <a:lstStyle/>
           <a:p>
-            <a:endParaRPr lang="nl-BE" dirty="0"/>
+            <a:r>
+              <a:rPr lang="en-US" dirty="0" err="1" smtClean="0"/>
+              <a:t>Overzicht</a:t>
+            </a:r>
+            <a:endParaRPr lang="en-US" dirty="0"/>
+          </a:p>
+          <a:p>
+            <a:pPr lvl="1"/>
+            <a:r>
+              <a:rPr lang="en-US" dirty="0" smtClean="0"/>
+              <a:t>Build status</a:t>
+            </a:r>
+          </a:p>
+          <a:p>
+            <a:pPr lvl="1"/>
+            <a:r>
+              <a:rPr lang="en-US" dirty="0" smtClean="0"/>
+              <a:t>Snapshot </a:t>
+            </a:r>
+          </a:p>
+          <a:p>
+            <a:pPr lvl="1"/>
+            <a:r>
+              <a:rPr lang="en-US" dirty="0" smtClean="0"/>
+              <a:t>Build progress</a:t>
+            </a:r>
+          </a:p>
+          <a:p>
+            <a:pPr lvl="1"/>
+            <a:endParaRPr lang="en-US" dirty="0"/>
+          </a:p>
+          <a:p>
+            <a:pPr lvl="1"/>
+            <a:r>
+              <a:rPr lang="en-US" dirty="0" smtClean="0"/>
+              <a:t>Logs, items in build,…</a:t>
+            </a:r>
           </a:p>
         </p:txBody>
       </p:sp>
@@ -11350,7 +11541,7 @@
         </p:blipFill>
         <p:spPr>
           <a:xfrm>
-            <a:off x="3367896" y="1542826"/>
+            <a:off x="6351241" y="1542826"/>
             <a:ext cx="5016985" cy="4640711"/>
           </a:xfrm>
           <a:prstGeom prst="rect">
@@ -11358,6 +11549,138 @@
           </a:prstGeom>
         </p:spPr>
       </p:pic>
+      <p:sp>
+        <p:nvSpPr>
+          <p:cNvPr id="6" name="Rectangle 5"/>
+          <p:cNvSpPr/>
+          <p:nvPr/>
+        </p:nvSpPr>
+        <p:spPr>
+          <a:xfrm>
+            <a:off x="6483927" y="2576600"/>
+            <a:ext cx="4209952" cy="609945"/>
+          </a:xfrm>
+          <a:prstGeom prst="rect">
+            <a:avLst/>
+          </a:prstGeom>
+          <a:noFill/>
+          <a:ln w="25400">
+            <a:solidFill>
+              <a:srgbClr val="FF0000"/>
+            </a:solidFill>
+          </a:ln>
+        </p:spPr>
+        <p:style>
+          <a:lnRef idx="1">
+            <a:schemeClr val="accent1"/>
+          </a:lnRef>
+          <a:fillRef idx="3">
+            <a:schemeClr val="accent1"/>
+          </a:fillRef>
+          <a:effectRef idx="2">
+            <a:schemeClr val="accent1"/>
+          </a:effectRef>
+          <a:fontRef idx="minor">
+            <a:schemeClr val="lt1"/>
+          </a:fontRef>
+        </p:style>
+        <p:txBody>
+          <a:bodyPr rtlCol="0" anchor="ctr"/>
+          <a:lstStyle/>
+          <a:p>
+            <a:pPr algn="ctr"/>
+            <a:endParaRPr lang="nl-BE"/>
+          </a:p>
+        </p:txBody>
+      </p:sp>
+      <p:sp>
+        <p:nvSpPr>
+          <p:cNvPr id="7" name="Rectangle 6"/>
+          <p:cNvSpPr/>
+          <p:nvPr/>
+        </p:nvSpPr>
+        <p:spPr>
+          <a:xfrm>
+            <a:off x="6483927" y="4064000"/>
+            <a:ext cx="4209952" cy="184729"/>
+          </a:xfrm>
+          <a:prstGeom prst="rect">
+            <a:avLst/>
+          </a:prstGeom>
+          <a:noFill/>
+          <a:ln w="25400">
+            <a:solidFill>
+              <a:srgbClr val="FF0000"/>
+            </a:solidFill>
+          </a:ln>
+        </p:spPr>
+        <p:style>
+          <a:lnRef idx="1">
+            <a:schemeClr val="accent1"/>
+          </a:lnRef>
+          <a:fillRef idx="3">
+            <a:schemeClr val="accent1"/>
+          </a:fillRef>
+          <a:effectRef idx="2">
+            <a:schemeClr val="accent1"/>
+          </a:effectRef>
+          <a:fontRef idx="minor">
+            <a:schemeClr val="lt1"/>
+          </a:fontRef>
+        </p:style>
+        <p:txBody>
+          <a:bodyPr rtlCol="0" anchor="ctr"/>
+          <a:lstStyle/>
+          <a:p>
+            <a:pPr algn="ctr"/>
+            <a:endParaRPr lang="nl-BE"/>
+          </a:p>
+        </p:txBody>
+      </p:sp>
+      <p:sp>
+        <p:nvSpPr>
+          <p:cNvPr id="8" name="Rectangle 7"/>
+          <p:cNvSpPr/>
+          <p:nvPr/>
+        </p:nvSpPr>
+        <p:spPr>
+          <a:xfrm>
+            <a:off x="6462073" y="5440219"/>
+            <a:ext cx="4231806" cy="868506"/>
+          </a:xfrm>
+          <a:prstGeom prst="rect">
+            <a:avLst/>
+          </a:prstGeom>
+          <a:noFill/>
+          <a:ln w="25400">
+            <a:solidFill>
+              <a:srgbClr val="FF0000"/>
+            </a:solidFill>
+          </a:ln>
+        </p:spPr>
+        <p:style>
+          <a:lnRef idx="1">
+            <a:schemeClr val="accent1"/>
+          </a:lnRef>
+          <a:fillRef idx="3">
+            <a:schemeClr val="accent1"/>
+          </a:fillRef>
+          <a:effectRef idx="2">
+            <a:schemeClr val="accent1"/>
+          </a:effectRef>
+          <a:fontRef idx="minor">
+            <a:schemeClr val="lt1"/>
+          </a:fontRef>
+        </p:style>
+        <p:txBody>
+          <a:bodyPr rtlCol="0" anchor="ctr"/>
+          <a:lstStyle/>
+          <a:p>
+            <a:pPr algn="ctr"/>
+            <a:endParaRPr lang="nl-BE"/>
+          </a:p>
+        </p:txBody>
+      </p:sp>
     </p:spTree>
     <p:extLst>
       <p:ext uri="{BB962C8B-B14F-4D97-AF65-F5344CB8AC3E}">
@@ -11951,7 +12274,7 @@
   <a:extraClrSchemeLst/>
   <a:extLst>
     <a:ext uri="{05A4C25C-085E-4340-85A3-A5531E510DB2}">
-      <thm15:themeFamily xmlns="" xmlns:thm15="http://schemas.microsoft.com/office/thememl/2012/main" name="Office Theme" id="{62F939B6-93AF-4DB8-9C6B-D6C7DFDC589F}" vid="{4A3C46E8-61CC-4603-A589-7422A47A8E4A}"/>
+      <thm15:themeFamily xmlns:thm15="http://schemas.microsoft.com/office/thememl/2012/main" name="Office Theme" id="{62F939B6-93AF-4DB8-9C6B-D6C7DFDC589F}" vid="{4A3C46E8-61CC-4603-A589-7422A47A8E4A}"/>
     </a:ext>
   </a:extLst>
 </a:theme>

</xml_diff>